<commit_message>
vault backup: 2024-10-02 13:24:09
</commit_message>
<xml_diff>
--- a/Vakken Y2/Crossmediale onderzoeksweken/Huib Modderkolk/Huib redactie.pptx
+++ b/Vakken Y2/Crossmediale onderzoeksweken/Huib Modderkolk/Huib redactie.pptx
@@ -7,6 +7,9 @@
   <p:sldIdLst>
     <p:sldId id="256" r:id="rId2"/>
     <p:sldId id="257" r:id="rId3"/>
+    <p:sldId id="258" r:id="rId4"/>
+    <p:sldId id="259" r:id="rId5"/>
+    <p:sldId id="260" r:id="rId6"/>
   </p:sldIdLst>
   <p:sldSz cx="12192000" cy="6858000"/>
   <p:notesSz cx="6858000" cy="9144000"/>
@@ -105,6 +108,11 @@
       </a:defRPr>
     </a:lvl9pPr>
   </p:defaultTextStyle>
+  <p:extLst>
+    <p:ext uri="{EFAFB233-063F-42B5-8137-9DF3F51BA10A}">
+      <p15:sldGuideLst xmlns:p15="http://schemas.microsoft.com/office/powerpoint/2012/main"/>
+    </p:ext>
+  </p:extLst>
 </p:presentation>
 </file>
 
@@ -255,7 +263,7 @@
           <a:p>
             <a:fld id="{FCB47A88-32D6-494E-9FC6-AEAE659FA679}" type="datetimeFigureOut">
               <a:rPr lang="en-US" smtClean="0"/>
-              <a:t>10/1/2024</a:t>
+              <a:t>10/2/2024</a:t>
             </a:fld>
             <a:endParaRPr lang="en-US"/>
           </a:p>
@@ -453,7 +461,7 @@
           <a:p>
             <a:fld id="{FCB47A88-32D6-494E-9FC6-AEAE659FA679}" type="datetimeFigureOut">
               <a:rPr lang="en-US" smtClean="0"/>
-              <a:t>10/1/2024</a:t>
+              <a:t>10/2/2024</a:t>
             </a:fld>
             <a:endParaRPr lang="en-US"/>
           </a:p>
@@ -661,7 +669,7 @@
           <a:p>
             <a:fld id="{FCB47A88-32D6-494E-9FC6-AEAE659FA679}" type="datetimeFigureOut">
               <a:rPr lang="en-US" smtClean="0"/>
-              <a:t>10/1/2024</a:t>
+              <a:t>10/2/2024</a:t>
             </a:fld>
             <a:endParaRPr lang="en-US"/>
           </a:p>
@@ -859,7 +867,7 @@
           <a:p>
             <a:fld id="{FCB47A88-32D6-494E-9FC6-AEAE659FA679}" type="datetimeFigureOut">
               <a:rPr lang="en-US" smtClean="0"/>
-              <a:t>10/1/2024</a:t>
+              <a:t>10/2/2024</a:t>
             </a:fld>
             <a:endParaRPr lang="en-US"/>
           </a:p>
@@ -1134,7 +1142,7 @@
           <a:p>
             <a:fld id="{FCB47A88-32D6-494E-9FC6-AEAE659FA679}" type="datetimeFigureOut">
               <a:rPr lang="en-US" smtClean="0"/>
-              <a:t>10/1/2024</a:t>
+              <a:t>10/2/2024</a:t>
             </a:fld>
             <a:endParaRPr lang="en-US"/>
           </a:p>
@@ -1399,7 +1407,7 @@
           <a:p>
             <a:fld id="{FCB47A88-32D6-494E-9FC6-AEAE659FA679}" type="datetimeFigureOut">
               <a:rPr lang="en-US" smtClean="0"/>
-              <a:t>10/1/2024</a:t>
+              <a:t>10/2/2024</a:t>
             </a:fld>
             <a:endParaRPr lang="en-US"/>
           </a:p>
@@ -1811,7 +1819,7 @@
           <a:p>
             <a:fld id="{FCB47A88-32D6-494E-9FC6-AEAE659FA679}" type="datetimeFigureOut">
               <a:rPr lang="en-US" smtClean="0"/>
-              <a:t>10/1/2024</a:t>
+              <a:t>10/2/2024</a:t>
             </a:fld>
             <a:endParaRPr lang="en-US"/>
           </a:p>
@@ -1952,7 +1960,7 @@
           <a:p>
             <a:fld id="{FCB47A88-32D6-494E-9FC6-AEAE659FA679}" type="datetimeFigureOut">
               <a:rPr lang="en-US" smtClean="0"/>
-              <a:t>10/1/2024</a:t>
+              <a:t>10/2/2024</a:t>
             </a:fld>
             <a:endParaRPr lang="en-US"/>
           </a:p>
@@ -2065,7 +2073,7 @@
           <a:p>
             <a:fld id="{FCB47A88-32D6-494E-9FC6-AEAE659FA679}" type="datetimeFigureOut">
               <a:rPr lang="en-US" smtClean="0"/>
-              <a:t>10/1/2024</a:t>
+              <a:t>10/2/2024</a:t>
             </a:fld>
             <a:endParaRPr lang="en-US"/>
           </a:p>
@@ -2376,7 +2384,7 @@
           <a:p>
             <a:fld id="{FCB47A88-32D6-494E-9FC6-AEAE659FA679}" type="datetimeFigureOut">
               <a:rPr lang="en-US" smtClean="0"/>
-              <a:t>10/1/2024</a:t>
+              <a:t>10/2/2024</a:t>
             </a:fld>
             <a:endParaRPr lang="en-US"/>
           </a:p>
@@ -2664,7 +2672,7 @@
           <a:p>
             <a:fld id="{FCB47A88-32D6-494E-9FC6-AEAE659FA679}" type="datetimeFigureOut">
               <a:rPr lang="en-US" smtClean="0"/>
-              <a:t>10/1/2024</a:t>
+              <a:t>10/2/2024</a:t>
             </a:fld>
             <a:endParaRPr lang="en-US"/>
           </a:p>
@@ -2905,7 +2913,7 @@
           <a:p>
             <a:fld id="{FCB47A88-32D6-494E-9FC6-AEAE659FA679}" type="datetimeFigureOut">
               <a:rPr lang="en-US" smtClean="0"/>
-              <a:t>10/1/2024</a:t>
+              <a:t>10/2/2024</a:t>
             </a:fld>
             <a:endParaRPr lang="en-US"/>
           </a:p>
@@ -3478,7 +3486,9 @@
         </p:nvSpPr>
         <p:spPr/>
         <p:txBody>
-          <a:bodyPr/>
+          <a:bodyPr>
+            <a:normAutofit/>
+          </a:bodyPr>
           <a:lstStyle/>
           <a:p>
             <a:pPr marL="0" indent="0">
@@ -3490,18 +3500,38 @@
             <a:pPr marL="0" indent="0">
               <a:buNone/>
             </a:pPr>
+            <a:r>
+              <a:rPr lang="en-US" dirty="0" err="1"/>
+              <a:t>Vinden</a:t>
+            </a:r>
             <a:endParaRPr lang="en-US" dirty="0"/>
           </a:p>
           <a:p>
             <a:pPr marL="0" indent="0">
               <a:buNone/>
             </a:pPr>
+            <a:r>
+              <a:rPr lang="en-US" dirty="0">
+                <a:hlinkClick r:id="rId2"/>
+              </a:rPr>
+              <a:t>https://wearebigfoot.com/joris-voorn/</a:t>
+            </a:r>
             <a:endParaRPr lang="en-US" dirty="0"/>
           </a:p>
           <a:p>
             <a:pPr marL="0" indent="0">
               <a:buNone/>
             </a:pPr>
+            <a:r>
+              <a:rPr lang="en-US" dirty="0"/>
+              <a:t>Email manager: </a:t>
+            </a:r>
+            <a:r>
+              <a:rPr lang="en-US" dirty="0">
+                <a:hlinkClick r:id="rId3"/>
+              </a:rPr>
+              <a:t>john@wearebigfoot.com</a:t>
+            </a:r>
             <a:endParaRPr lang="en-US" dirty="0"/>
           </a:p>
           <a:p>
@@ -3721,7 +3751,7 @@
           <p:nvPr/>
         </p:nvPicPr>
         <p:blipFill>
-          <a:blip r:embed="rId2">
+          <a:blip r:embed="rId4">
             <a:extLst>
               <a:ext uri="{28A0092B-C50C-407E-A947-70E740481C1C}">
                 <a14:useLocalDpi xmlns:a14="http://schemas.microsoft.com/office/drawing/2010/main" val="0"/>
@@ -4020,6 +4050,2012 @@
     <p:extLst>
       <p:ext uri="{BB962C8B-B14F-4D97-AF65-F5344CB8AC3E}">
         <p14:creationId xmlns:p14="http://schemas.microsoft.com/office/powerpoint/2010/main" val="588232807"/>
+      </p:ext>
+    </p:extLst>
+  </p:cSld>
+  <p:clrMapOvr>
+    <a:masterClrMapping/>
+  </p:clrMapOvr>
+</p:sld>
+</file>
+
+<file path=ppt/slides/slide3.xml><?xml version="1.0" encoding="utf-8"?>
+<p:sld xmlns:a="http://schemas.openxmlformats.org/drawingml/2006/main" xmlns:r="http://schemas.openxmlformats.org/officeDocument/2006/relationships" xmlns:p="http://schemas.openxmlformats.org/presentationml/2006/main">
+  <p:cSld>
+    <p:spTree>
+      <p:nvGrpSpPr>
+        <p:cNvPr id="1" name=""/>
+        <p:cNvGrpSpPr/>
+        <p:nvPr/>
+      </p:nvGrpSpPr>
+      <p:grpSpPr>
+        <a:xfrm>
+          <a:off x="0" y="0"/>
+          <a:ext cx="0" cy="0"/>
+          <a:chOff x="0" y="0"/>
+          <a:chExt cx="0" cy="0"/>
+        </a:xfrm>
+      </p:grpSpPr>
+      <p:sp>
+        <p:nvSpPr>
+          <p:cNvPr id="2" name="Title 1">
+            <a:extLst>
+              <a:ext uri="{FF2B5EF4-FFF2-40B4-BE49-F238E27FC236}">
+                <a16:creationId xmlns:a16="http://schemas.microsoft.com/office/drawing/2014/main" id="{16035FBD-A672-D45A-696A-18CDD6E8A1D9}"/>
+              </a:ext>
+            </a:extLst>
+          </p:cNvPr>
+          <p:cNvSpPr>
+            <a:spLocks noGrp="1"/>
+          </p:cNvSpPr>
+          <p:nvPr>
+            <p:ph type="title"/>
+          </p:nvPr>
+        </p:nvSpPr>
+        <p:spPr/>
+        <p:txBody>
+          <a:bodyPr/>
+          <a:lstStyle/>
+          <a:p>
+            <a:endParaRPr lang="en-US" dirty="0"/>
+          </a:p>
+        </p:txBody>
+      </p:sp>
+      <p:sp>
+        <p:nvSpPr>
+          <p:cNvPr id="3" name="Content Placeholder 2">
+            <a:extLst>
+              <a:ext uri="{FF2B5EF4-FFF2-40B4-BE49-F238E27FC236}">
+                <a16:creationId xmlns:a16="http://schemas.microsoft.com/office/drawing/2014/main" id="{A372109C-CA95-222F-0F97-CB76EFF8A2D5}"/>
+              </a:ext>
+            </a:extLst>
+          </p:cNvPr>
+          <p:cNvSpPr>
+            <a:spLocks noGrp="1"/>
+          </p:cNvSpPr>
+          <p:nvPr>
+            <p:ph idx="1"/>
+          </p:nvPr>
+        </p:nvSpPr>
+        <p:spPr/>
+        <p:txBody>
+          <a:bodyPr>
+            <a:normAutofit/>
+          </a:bodyPr>
+          <a:lstStyle/>
+          <a:p>
+            <a:pPr marL="0" indent="0">
+              <a:buNone/>
+            </a:pPr>
+            <a:endParaRPr lang="nl-NL" dirty="0"/>
+          </a:p>
+          <a:p>
+            <a:pPr marL="0" indent="0">
+              <a:buNone/>
+            </a:pPr>
+            <a:r>
+              <a:rPr lang="en-US" dirty="0" err="1"/>
+              <a:t>Vinden</a:t>
+            </a:r>
+            <a:endParaRPr lang="en-US" dirty="0"/>
+          </a:p>
+          <a:p>
+            <a:pPr marL="0" indent="0">
+              <a:buNone/>
+            </a:pPr>
+            <a:r>
+              <a:rPr lang="en-US" sz="1400" dirty="0">
+                <a:hlinkClick r:id="rId2"/>
+              </a:rPr>
+              <a:t>https://www.linkedin.com/in/eelco-bosch-van-rosenthal-03a3b85/?originalSubdomain=nl</a:t>
+            </a:r>
+            <a:endParaRPr lang="en-US" sz="1400" dirty="0"/>
+          </a:p>
+          <a:p>
+            <a:pPr marL="0" indent="0">
+              <a:buNone/>
+            </a:pPr>
+            <a:r>
+              <a:rPr lang="en-US" sz="1400" dirty="0"/>
+              <a:t>Zit </a:t>
+            </a:r>
+            <a:r>
+              <a:rPr lang="en-US" sz="1400" dirty="0" err="1"/>
+              <a:t>bij</a:t>
+            </a:r>
+            <a:r>
+              <a:rPr lang="en-US" sz="1400" dirty="0"/>
+              <a:t> </a:t>
+            </a:r>
+            <a:r>
+              <a:rPr lang="en-US" sz="1400" dirty="0" err="1"/>
+              <a:t>Nieuwsuur</a:t>
+            </a:r>
+            <a:r>
+              <a:rPr lang="en-US" sz="1400" dirty="0"/>
+              <a:t>, Twan </a:t>
+            </a:r>
+            <a:r>
+              <a:rPr lang="en-US" sz="1400" dirty="0" err="1"/>
+              <a:t>kan</a:t>
+            </a:r>
+            <a:r>
+              <a:rPr lang="en-US" sz="1400" dirty="0"/>
+              <a:t> contact </a:t>
+            </a:r>
+            <a:r>
+              <a:rPr lang="en-US" sz="1400" dirty="0" err="1"/>
+              <a:t>gegevens</a:t>
+            </a:r>
+            <a:r>
+              <a:rPr lang="en-US" sz="1400" dirty="0"/>
+              <a:t> </a:t>
+            </a:r>
+            <a:r>
+              <a:rPr lang="en-US" sz="1400" dirty="0" err="1"/>
+              <a:t>geven</a:t>
+            </a:r>
+            <a:endParaRPr lang="en-US" sz="1400" dirty="0"/>
+          </a:p>
+          <a:p>
+            <a:pPr marL="0" indent="0">
+              <a:buNone/>
+            </a:pPr>
+            <a:endParaRPr lang="en-US" sz="1400" dirty="0"/>
+          </a:p>
+          <a:p>
+            <a:pPr marL="0" indent="0">
+              <a:buNone/>
+            </a:pPr>
+            <a:r>
+              <a:rPr lang="en-US" dirty="0" err="1"/>
+              <a:t>Inhoud</a:t>
+            </a:r>
+            <a:r>
+              <a:rPr lang="en-US" dirty="0"/>
+              <a:t> video:</a:t>
+            </a:r>
+          </a:p>
+          <a:p>
+            <a:r>
+              <a:rPr lang="nl-NL" sz="2000" dirty="0"/>
+              <a:t>Interview Edward </a:t>
+            </a:r>
+            <a:r>
+              <a:rPr lang="nl-NL" sz="2000" dirty="0" err="1"/>
+              <a:t>Snowden</a:t>
+            </a:r>
+            <a:endParaRPr lang="nl-NL" sz="2000" dirty="0"/>
+          </a:p>
+          <a:p>
+            <a:r>
+              <a:rPr lang="nl-NL" sz="2000" dirty="0"/>
+              <a:t>Hoe verliep de samenwerking?</a:t>
+            </a:r>
+          </a:p>
+          <a:p>
+            <a:r>
+              <a:rPr lang="nl-NL" sz="2000" dirty="0"/>
+              <a:t>Joris </a:t>
+            </a:r>
+            <a:r>
+              <a:rPr lang="nl-NL" sz="2000" dirty="0" err="1"/>
+              <a:t>Hentenaar</a:t>
+            </a:r>
+            <a:r>
+              <a:rPr lang="nl-NL" sz="2000" dirty="0"/>
+              <a:t> → videobeelden</a:t>
+            </a:r>
+          </a:p>
+          <a:p>
+            <a:pPr marL="0" indent="0">
+              <a:buNone/>
+            </a:pPr>
+            <a:endParaRPr lang="en-US" sz="2400" dirty="0"/>
+          </a:p>
+        </p:txBody>
+      </p:sp>
+      <p:sp>
+        <p:nvSpPr>
+          <p:cNvPr id="4" name="Rectangle: Rounded Corners 3">
+            <a:extLst>
+              <a:ext uri="{FF2B5EF4-FFF2-40B4-BE49-F238E27FC236}">
+                <a16:creationId xmlns:a16="http://schemas.microsoft.com/office/drawing/2014/main" id="{A029AAF1-999B-AD6E-111D-263E4B4FEA16}"/>
+              </a:ext>
+            </a:extLst>
+          </p:cNvPr>
+          <p:cNvSpPr/>
+          <p:nvPr/>
+        </p:nvSpPr>
+        <p:spPr>
+          <a:xfrm>
+            <a:off x="585479" y="909506"/>
+            <a:ext cx="5137744" cy="749939"/>
+          </a:xfrm>
+          <a:prstGeom prst="roundRect">
+            <a:avLst>
+              <a:gd name="adj" fmla="val 50000"/>
+            </a:avLst>
+          </a:prstGeom>
+          <a:solidFill>
+            <a:schemeClr val="accent2">
+              <a:lumMod val="75000"/>
+            </a:schemeClr>
+          </a:solidFill>
+          <a:ln>
+            <a:noFill/>
+          </a:ln>
+        </p:spPr>
+        <p:style>
+          <a:lnRef idx="2">
+            <a:schemeClr val="accent1">
+              <a:shade val="15000"/>
+            </a:schemeClr>
+          </a:lnRef>
+          <a:fillRef idx="1">
+            <a:schemeClr val="accent1"/>
+          </a:fillRef>
+          <a:effectRef idx="0">
+            <a:schemeClr val="accent1"/>
+          </a:effectRef>
+          <a:fontRef idx="minor">
+            <a:schemeClr val="lt1"/>
+          </a:fontRef>
+        </p:style>
+        <p:txBody>
+          <a:bodyPr rtlCol="0" anchor="ctr"/>
+          <a:lstStyle/>
+          <a:p>
+            <a:pPr algn="ctr"/>
+            <a:endParaRPr lang="en-US"/>
+          </a:p>
+        </p:txBody>
+      </p:sp>
+      <p:sp>
+        <p:nvSpPr>
+          <p:cNvPr id="5" name="Title 1">
+            <a:extLst>
+              <a:ext uri="{FF2B5EF4-FFF2-40B4-BE49-F238E27FC236}">
+                <a16:creationId xmlns:a16="http://schemas.microsoft.com/office/drawing/2014/main" id="{3A1E058A-6FE5-DC88-409E-865AEBDC4227}"/>
+              </a:ext>
+            </a:extLst>
+          </p:cNvPr>
+          <p:cNvSpPr txBox="1">
+            <a:spLocks/>
+          </p:cNvSpPr>
+          <p:nvPr/>
+        </p:nvSpPr>
+        <p:spPr>
+          <a:xfrm>
+            <a:off x="1032812" y="90675"/>
+            <a:ext cx="9144000" cy="2387600"/>
+          </a:xfrm>
+          <a:prstGeom prst="rect">
+            <a:avLst/>
+          </a:prstGeom>
+        </p:spPr>
+        <p:txBody>
+          <a:bodyPr vert="horz" lIns="91440" tIns="45720" rIns="91440" bIns="45720" rtlCol="0" anchor="ctr">
+            <a:normAutofit/>
+          </a:bodyPr>
+          <a:lstStyle>
+            <a:lvl1pPr algn="l" defTabSz="914400" rtl="0" eaLnBrk="1" latinLnBrk="0" hangingPunct="1">
+              <a:lnSpc>
+                <a:spcPct val="90000"/>
+              </a:lnSpc>
+              <a:spcBef>
+                <a:spcPct val="0"/>
+              </a:spcBef>
+              <a:buNone/>
+              <a:defRPr sz="4400" kern="1200">
+                <a:solidFill>
+                  <a:schemeClr val="tx1"/>
+                </a:solidFill>
+                <a:latin typeface="+mj-lt"/>
+                <a:ea typeface="+mj-ea"/>
+                <a:cs typeface="+mj-cs"/>
+              </a:defRPr>
+            </a:lvl1pPr>
+          </a:lstStyle>
+          <a:p>
+            <a:r>
+              <a:rPr lang="nl-NL" sz="2800" dirty="0">
+                <a:solidFill>
+                  <a:schemeClr val="bg1"/>
+                </a:solidFill>
+                <a:latin typeface="Euclid Circular A Trial Medium" panose="020B0604000000000000" pitchFamily="34" charset="0"/>
+              </a:rPr>
+              <a:t>Interview </a:t>
+            </a:r>
+            <a:r>
+              <a:rPr lang="nl-NL" sz="2800" dirty="0" err="1">
+                <a:solidFill>
+                  <a:schemeClr val="bg1"/>
+                </a:solidFill>
+                <a:latin typeface="Euclid Circular A Trial Medium" panose="020B0604000000000000" pitchFamily="34" charset="0"/>
+              </a:rPr>
+              <a:t>Snowden</a:t>
+            </a:r>
+            <a:endParaRPr lang="en-US" sz="2800" dirty="0">
+              <a:solidFill>
+                <a:schemeClr val="bg1"/>
+              </a:solidFill>
+              <a:latin typeface="Euclid Circular A Trial Medium" panose="020B0604000000000000" pitchFamily="34" charset="0"/>
+            </a:endParaRPr>
+          </a:p>
+        </p:txBody>
+      </p:sp>
+      <p:pic>
+        <p:nvPicPr>
+          <p:cNvPr id="1026" name="Picture 2" descr="When We Dip: Joris Voorn reimagines the classic of Format 'Solid Session'">
+            <a:extLst>
+              <a:ext uri="{FF2B5EF4-FFF2-40B4-BE49-F238E27FC236}">
+                <a16:creationId xmlns:a16="http://schemas.microsoft.com/office/drawing/2014/main" id="{92A945E7-C4BE-6335-0624-1EC331908950}"/>
+              </a:ext>
+            </a:extLst>
+          </p:cNvPr>
+          <p:cNvPicPr>
+            <a:picLocks noChangeAspect="1" noChangeArrowheads="1"/>
+          </p:cNvPicPr>
+          <p:nvPr/>
+        </p:nvPicPr>
+        <p:blipFill>
+          <a:blip r:embed="rId3">
+            <a:extLst>
+              <a:ext uri="{28A0092B-C50C-407E-A947-70E740481C1C}">
+                <a14:useLocalDpi xmlns:a14="http://schemas.microsoft.com/office/drawing/2010/main" val="0"/>
+              </a:ext>
+            </a:extLst>
+          </a:blip>
+          <a:srcRect/>
+          <a:stretch>
+            <a:fillRect/>
+          </a:stretch>
+        </p:blipFill>
+        <p:spPr bwMode="auto">
+          <a:xfrm>
+            <a:off x="8309031" y="1825625"/>
+            <a:ext cx="3044769" cy="3044769"/>
+          </a:xfrm>
+          <a:prstGeom prst="rect">
+            <a:avLst/>
+          </a:prstGeom>
+          <a:noFill/>
+          <a:extLst>
+            <a:ext uri="{909E8E84-426E-40DD-AFC4-6F175D3DCCD1}">
+              <a14:hiddenFill xmlns:a14="http://schemas.microsoft.com/office/drawing/2010/main">
+                <a:solidFill>
+                  <a:srgbClr val="FFFFFF"/>
+                </a:solidFill>
+              </a14:hiddenFill>
+            </a:ext>
+          </a:extLst>
+        </p:spPr>
+      </p:pic>
+      <p:sp>
+        <p:nvSpPr>
+          <p:cNvPr id="6" name="Rectangle 5">
+            <a:extLst>
+              <a:ext uri="{FF2B5EF4-FFF2-40B4-BE49-F238E27FC236}">
+                <a16:creationId xmlns:a16="http://schemas.microsoft.com/office/drawing/2014/main" id="{F92C3A3C-7EB9-4404-4304-037F668507A9}"/>
+              </a:ext>
+            </a:extLst>
+          </p:cNvPr>
+          <p:cNvSpPr/>
+          <p:nvPr/>
+        </p:nvSpPr>
+        <p:spPr>
+          <a:xfrm>
+            <a:off x="8309031" y="4870394"/>
+            <a:ext cx="3044769" cy="513117"/>
+          </a:xfrm>
+          <a:prstGeom prst="rect">
+            <a:avLst/>
+          </a:prstGeom>
+          <a:solidFill>
+            <a:schemeClr val="bg1">
+              <a:lumMod val="85000"/>
+            </a:schemeClr>
+          </a:solidFill>
+          <a:ln>
+            <a:noFill/>
+          </a:ln>
+        </p:spPr>
+        <p:style>
+          <a:lnRef idx="2">
+            <a:schemeClr val="accent1">
+              <a:shade val="15000"/>
+            </a:schemeClr>
+          </a:lnRef>
+          <a:fillRef idx="1">
+            <a:schemeClr val="accent1"/>
+          </a:fillRef>
+          <a:effectRef idx="0">
+            <a:schemeClr val="accent1"/>
+          </a:effectRef>
+          <a:fontRef idx="minor">
+            <a:schemeClr val="lt1"/>
+          </a:fontRef>
+        </p:style>
+        <p:txBody>
+          <a:bodyPr rtlCol="0" anchor="ctr"/>
+          <a:lstStyle/>
+          <a:p>
+            <a:pPr algn="ctr"/>
+            <a:endParaRPr lang="en-US"/>
+          </a:p>
+        </p:txBody>
+      </p:sp>
+      <p:sp>
+        <p:nvSpPr>
+          <p:cNvPr id="7" name="Subtitle 2">
+            <a:extLst>
+              <a:ext uri="{FF2B5EF4-FFF2-40B4-BE49-F238E27FC236}">
+                <a16:creationId xmlns:a16="http://schemas.microsoft.com/office/drawing/2014/main" id="{1F2DE905-609D-4804-041F-20AFB030EF01}"/>
+              </a:ext>
+            </a:extLst>
+          </p:cNvPr>
+          <p:cNvSpPr txBox="1">
+            <a:spLocks/>
+          </p:cNvSpPr>
+          <p:nvPr/>
+        </p:nvSpPr>
+        <p:spPr>
+          <a:xfrm>
+            <a:off x="8309031" y="4983909"/>
+            <a:ext cx="3044769" cy="378179"/>
+          </a:xfrm>
+          <a:prstGeom prst="rect">
+            <a:avLst/>
+          </a:prstGeom>
+        </p:spPr>
+        <p:txBody>
+          <a:bodyPr vert="horz" lIns="91440" tIns="45720" rIns="91440" bIns="45720" rtlCol="0">
+            <a:normAutofit fontScale="55000" lnSpcReduction="20000"/>
+          </a:bodyPr>
+          <a:lstStyle>
+            <a:lvl1pPr marL="228600" indent="-228600" algn="l" defTabSz="914400" rtl="0" eaLnBrk="1" latinLnBrk="0" hangingPunct="1">
+              <a:lnSpc>
+                <a:spcPct val="90000"/>
+              </a:lnSpc>
+              <a:spcBef>
+                <a:spcPts val="1000"/>
+              </a:spcBef>
+              <a:buFont typeface="Arial" panose="020B0604020202020204" pitchFamily="34" charset="0"/>
+              <a:buChar char="•"/>
+              <a:defRPr sz="2800" kern="1200">
+                <a:solidFill>
+                  <a:schemeClr val="tx1"/>
+                </a:solidFill>
+                <a:latin typeface="+mn-lt"/>
+                <a:ea typeface="+mn-ea"/>
+                <a:cs typeface="+mn-cs"/>
+              </a:defRPr>
+            </a:lvl1pPr>
+            <a:lvl2pPr marL="685800" indent="-228600" algn="l" defTabSz="914400" rtl="0" eaLnBrk="1" latinLnBrk="0" hangingPunct="1">
+              <a:lnSpc>
+                <a:spcPct val="90000"/>
+              </a:lnSpc>
+              <a:spcBef>
+                <a:spcPts val="500"/>
+              </a:spcBef>
+              <a:buFont typeface="Arial" panose="020B0604020202020204" pitchFamily="34" charset="0"/>
+              <a:buChar char="•"/>
+              <a:defRPr sz="2400" kern="1200">
+                <a:solidFill>
+                  <a:schemeClr val="tx1"/>
+                </a:solidFill>
+                <a:latin typeface="+mn-lt"/>
+                <a:ea typeface="+mn-ea"/>
+                <a:cs typeface="+mn-cs"/>
+              </a:defRPr>
+            </a:lvl2pPr>
+            <a:lvl3pPr marL="1143000" indent="-228600" algn="l" defTabSz="914400" rtl="0" eaLnBrk="1" latinLnBrk="0" hangingPunct="1">
+              <a:lnSpc>
+                <a:spcPct val="90000"/>
+              </a:lnSpc>
+              <a:spcBef>
+                <a:spcPts val="500"/>
+              </a:spcBef>
+              <a:buFont typeface="Arial" panose="020B0604020202020204" pitchFamily="34" charset="0"/>
+              <a:buChar char="•"/>
+              <a:defRPr sz="2000" kern="1200">
+                <a:solidFill>
+                  <a:schemeClr val="tx1"/>
+                </a:solidFill>
+                <a:latin typeface="+mn-lt"/>
+                <a:ea typeface="+mn-ea"/>
+                <a:cs typeface="+mn-cs"/>
+              </a:defRPr>
+            </a:lvl3pPr>
+            <a:lvl4pPr marL="1600200" indent="-228600" algn="l" defTabSz="914400" rtl="0" eaLnBrk="1" latinLnBrk="0" hangingPunct="1">
+              <a:lnSpc>
+                <a:spcPct val="90000"/>
+              </a:lnSpc>
+              <a:spcBef>
+                <a:spcPts val="500"/>
+              </a:spcBef>
+              <a:buFont typeface="Arial" panose="020B0604020202020204" pitchFamily="34" charset="0"/>
+              <a:buChar char="•"/>
+              <a:defRPr sz="1800" kern="1200">
+                <a:solidFill>
+                  <a:schemeClr val="tx1"/>
+                </a:solidFill>
+                <a:latin typeface="+mn-lt"/>
+                <a:ea typeface="+mn-ea"/>
+                <a:cs typeface="+mn-cs"/>
+              </a:defRPr>
+            </a:lvl4pPr>
+            <a:lvl5pPr marL="2057400" indent="-228600" algn="l" defTabSz="914400" rtl="0" eaLnBrk="1" latinLnBrk="0" hangingPunct="1">
+              <a:lnSpc>
+                <a:spcPct val="90000"/>
+              </a:lnSpc>
+              <a:spcBef>
+                <a:spcPts val="500"/>
+              </a:spcBef>
+              <a:buFont typeface="Arial" panose="020B0604020202020204" pitchFamily="34" charset="0"/>
+              <a:buChar char="•"/>
+              <a:defRPr sz="1800" kern="1200">
+                <a:solidFill>
+                  <a:schemeClr val="tx1"/>
+                </a:solidFill>
+                <a:latin typeface="+mn-lt"/>
+                <a:ea typeface="+mn-ea"/>
+                <a:cs typeface="+mn-cs"/>
+              </a:defRPr>
+            </a:lvl5pPr>
+            <a:lvl6pPr marL="2514600" indent="-228600" algn="l" defTabSz="914400" rtl="0" eaLnBrk="1" latinLnBrk="0" hangingPunct="1">
+              <a:lnSpc>
+                <a:spcPct val="90000"/>
+              </a:lnSpc>
+              <a:spcBef>
+                <a:spcPts val="500"/>
+              </a:spcBef>
+              <a:buFont typeface="Arial" panose="020B0604020202020204" pitchFamily="34" charset="0"/>
+              <a:buChar char="•"/>
+              <a:defRPr sz="1800" kern="1200">
+                <a:solidFill>
+                  <a:schemeClr val="tx1"/>
+                </a:solidFill>
+                <a:latin typeface="+mn-lt"/>
+                <a:ea typeface="+mn-ea"/>
+                <a:cs typeface="+mn-cs"/>
+              </a:defRPr>
+            </a:lvl6pPr>
+            <a:lvl7pPr marL="2971800" indent="-228600" algn="l" defTabSz="914400" rtl="0" eaLnBrk="1" latinLnBrk="0" hangingPunct="1">
+              <a:lnSpc>
+                <a:spcPct val="90000"/>
+              </a:lnSpc>
+              <a:spcBef>
+                <a:spcPts val="500"/>
+              </a:spcBef>
+              <a:buFont typeface="Arial" panose="020B0604020202020204" pitchFamily="34" charset="0"/>
+              <a:buChar char="•"/>
+              <a:defRPr sz="1800" kern="1200">
+                <a:solidFill>
+                  <a:schemeClr val="tx1"/>
+                </a:solidFill>
+                <a:latin typeface="+mn-lt"/>
+                <a:ea typeface="+mn-ea"/>
+                <a:cs typeface="+mn-cs"/>
+              </a:defRPr>
+            </a:lvl7pPr>
+            <a:lvl8pPr marL="3429000" indent="-228600" algn="l" defTabSz="914400" rtl="0" eaLnBrk="1" latinLnBrk="0" hangingPunct="1">
+              <a:lnSpc>
+                <a:spcPct val="90000"/>
+              </a:lnSpc>
+              <a:spcBef>
+                <a:spcPts val="500"/>
+              </a:spcBef>
+              <a:buFont typeface="Arial" panose="020B0604020202020204" pitchFamily="34" charset="0"/>
+              <a:buChar char="•"/>
+              <a:defRPr sz="1800" kern="1200">
+                <a:solidFill>
+                  <a:schemeClr val="tx1"/>
+                </a:solidFill>
+                <a:latin typeface="+mn-lt"/>
+                <a:ea typeface="+mn-ea"/>
+                <a:cs typeface="+mn-cs"/>
+              </a:defRPr>
+            </a:lvl8pPr>
+            <a:lvl9pPr marL="3886200" indent="-228600" algn="l" defTabSz="914400" rtl="0" eaLnBrk="1" latinLnBrk="0" hangingPunct="1">
+              <a:lnSpc>
+                <a:spcPct val="90000"/>
+              </a:lnSpc>
+              <a:spcBef>
+                <a:spcPts val="500"/>
+              </a:spcBef>
+              <a:buFont typeface="Arial" panose="020B0604020202020204" pitchFamily="34" charset="0"/>
+              <a:buChar char="•"/>
+              <a:defRPr sz="1800" kern="1200">
+                <a:solidFill>
+                  <a:schemeClr val="tx1"/>
+                </a:solidFill>
+                <a:latin typeface="+mn-lt"/>
+                <a:ea typeface="+mn-ea"/>
+                <a:cs typeface="+mn-cs"/>
+              </a:defRPr>
+            </a:lvl9pPr>
+          </a:lstStyle>
+          <a:p>
+            <a:pPr marL="0" indent="0" algn="ctr">
+              <a:buNone/>
+            </a:pPr>
+            <a:r>
+              <a:rPr lang="nl-NL" dirty="0">
+                <a:latin typeface="Euclid Circular A Trial Light" panose="020B0304000000000000" pitchFamily="34" charset="0"/>
+                <a:ea typeface="HGSSoeiKakugothicUB" panose="020B0400000000000000" pitchFamily="34" charset="-128"/>
+              </a:rPr>
+              <a:t>Eelco Bosch van Rosenthal </a:t>
+            </a:r>
+            <a:endParaRPr lang="en-US" dirty="0">
+              <a:latin typeface="Euclid Circular A Trial Light" panose="020B0304000000000000" pitchFamily="34" charset="0"/>
+              <a:ea typeface="HGSSoeiKakugothicUB" panose="020B0400000000000000" pitchFamily="34" charset="-128"/>
+            </a:endParaRPr>
+          </a:p>
+        </p:txBody>
+      </p:sp>
+      <p:pic>
+        <p:nvPicPr>
+          <p:cNvPr id="8" name="Picture 2" descr="Eelco Bosch van Rosenthal – Studium Generale Universiteit ...">
+            <a:extLst>
+              <a:ext uri="{FF2B5EF4-FFF2-40B4-BE49-F238E27FC236}">
+                <a16:creationId xmlns:a16="http://schemas.microsoft.com/office/drawing/2014/main" id="{F695686F-CB0A-2797-210D-350FFA97BE43}"/>
+              </a:ext>
+            </a:extLst>
+          </p:cNvPr>
+          <p:cNvPicPr>
+            <a:picLocks noChangeAspect="1" noChangeArrowheads="1"/>
+          </p:cNvPicPr>
+          <p:nvPr/>
+        </p:nvPicPr>
+        <p:blipFill>
+          <a:blip r:embed="rId4">
+            <a:extLst>
+              <a:ext uri="{28A0092B-C50C-407E-A947-70E740481C1C}">
+                <a14:useLocalDpi xmlns:a14="http://schemas.microsoft.com/office/drawing/2010/main" val="0"/>
+              </a:ext>
+            </a:extLst>
+          </a:blip>
+          <a:srcRect/>
+          <a:stretch>
+            <a:fillRect/>
+          </a:stretch>
+        </p:blipFill>
+        <p:spPr bwMode="auto">
+          <a:xfrm>
+            <a:off x="8303772" y="795988"/>
+            <a:ext cx="3050028" cy="4074406"/>
+          </a:xfrm>
+          <a:prstGeom prst="rect">
+            <a:avLst/>
+          </a:prstGeom>
+          <a:noFill/>
+          <a:extLst>
+            <a:ext uri="{909E8E84-426E-40DD-AFC4-6F175D3DCCD1}">
+              <a14:hiddenFill xmlns:a14="http://schemas.microsoft.com/office/drawing/2010/main">
+                <a:solidFill>
+                  <a:srgbClr val="FFFFFF"/>
+                </a:solidFill>
+              </a14:hiddenFill>
+            </a:ext>
+          </a:extLst>
+        </p:spPr>
+      </p:pic>
+    </p:spTree>
+    <p:extLst>
+      <p:ext uri="{BB962C8B-B14F-4D97-AF65-F5344CB8AC3E}">
+        <p14:creationId xmlns:p14="http://schemas.microsoft.com/office/powerpoint/2010/main" val="3277565120"/>
+      </p:ext>
+    </p:extLst>
+  </p:cSld>
+  <p:clrMapOvr>
+    <a:masterClrMapping/>
+  </p:clrMapOvr>
+</p:sld>
+</file>
+
+<file path=ppt/slides/slide4.xml><?xml version="1.0" encoding="utf-8"?>
+<p:sld xmlns:a="http://schemas.openxmlformats.org/drawingml/2006/main" xmlns:r="http://schemas.openxmlformats.org/officeDocument/2006/relationships" xmlns:p="http://schemas.openxmlformats.org/presentationml/2006/main">
+  <p:cSld>
+    <p:spTree>
+      <p:nvGrpSpPr>
+        <p:cNvPr id="1" name=""/>
+        <p:cNvGrpSpPr/>
+        <p:nvPr/>
+      </p:nvGrpSpPr>
+      <p:grpSpPr>
+        <a:xfrm>
+          <a:off x="0" y="0"/>
+          <a:ext cx="0" cy="0"/>
+          <a:chOff x="0" y="0"/>
+          <a:chExt cx="0" cy="0"/>
+        </a:xfrm>
+      </p:grpSpPr>
+      <p:sp>
+        <p:nvSpPr>
+          <p:cNvPr id="2" name="Title 1">
+            <a:extLst>
+              <a:ext uri="{FF2B5EF4-FFF2-40B4-BE49-F238E27FC236}">
+                <a16:creationId xmlns:a16="http://schemas.microsoft.com/office/drawing/2014/main" id="{16035FBD-A672-D45A-696A-18CDD6E8A1D9}"/>
+              </a:ext>
+            </a:extLst>
+          </p:cNvPr>
+          <p:cNvSpPr>
+            <a:spLocks noGrp="1"/>
+          </p:cNvSpPr>
+          <p:nvPr>
+            <p:ph type="title"/>
+          </p:nvPr>
+        </p:nvSpPr>
+        <p:spPr/>
+        <p:txBody>
+          <a:bodyPr/>
+          <a:lstStyle/>
+          <a:p>
+            <a:endParaRPr lang="en-US" dirty="0"/>
+          </a:p>
+        </p:txBody>
+      </p:sp>
+      <p:sp>
+        <p:nvSpPr>
+          <p:cNvPr id="3" name="Content Placeholder 2">
+            <a:extLst>
+              <a:ext uri="{FF2B5EF4-FFF2-40B4-BE49-F238E27FC236}">
+                <a16:creationId xmlns:a16="http://schemas.microsoft.com/office/drawing/2014/main" id="{A372109C-CA95-222F-0F97-CB76EFF8A2D5}"/>
+              </a:ext>
+            </a:extLst>
+          </p:cNvPr>
+          <p:cNvSpPr>
+            <a:spLocks noGrp="1"/>
+          </p:cNvSpPr>
+          <p:nvPr>
+            <p:ph idx="1"/>
+          </p:nvPr>
+        </p:nvSpPr>
+        <p:spPr/>
+        <p:txBody>
+          <a:bodyPr>
+            <a:normAutofit/>
+          </a:bodyPr>
+          <a:lstStyle/>
+          <a:p>
+            <a:pPr marL="0" indent="0">
+              <a:buNone/>
+            </a:pPr>
+            <a:endParaRPr lang="nl-NL" dirty="0"/>
+          </a:p>
+          <a:p>
+            <a:pPr marL="0" indent="0">
+              <a:buNone/>
+            </a:pPr>
+            <a:r>
+              <a:rPr lang="en-US" dirty="0" err="1"/>
+              <a:t>Vinden</a:t>
+            </a:r>
+            <a:endParaRPr lang="en-US" dirty="0"/>
+          </a:p>
+          <a:p>
+            <a:pPr marL="0" indent="0">
+              <a:buNone/>
+            </a:pPr>
+            <a:r>
+              <a:rPr lang="en-US" sz="1400" dirty="0" err="1"/>
+              <a:t>Bernette</a:t>
+            </a:r>
+            <a:r>
+              <a:rPr lang="en-US" sz="1400" dirty="0"/>
+              <a:t> </a:t>
+            </a:r>
+            <a:r>
+              <a:rPr lang="en-US" sz="1400" dirty="0">
+                <a:sym typeface="Wingdings" panose="05000000000000000000" pitchFamily="2" charset="2"/>
+              </a:rPr>
+              <a:t></a:t>
+            </a:r>
+            <a:endParaRPr lang="en-US" sz="1400" dirty="0"/>
+          </a:p>
+          <a:p>
+            <a:pPr marL="0" indent="0">
+              <a:buNone/>
+            </a:pPr>
+            <a:endParaRPr lang="en-US" sz="1400" dirty="0"/>
+          </a:p>
+          <a:p>
+            <a:pPr marL="0" indent="0">
+              <a:buNone/>
+            </a:pPr>
+            <a:r>
+              <a:rPr lang="en-US" dirty="0" err="1"/>
+              <a:t>Inhoud</a:t>
+            </a:r>
+            <a:r>
+              <a:rPr lang="en-US" dirty="0"/>
+              <a:t> video:</a:t>
+            </a:r>
+            <a:endParaRPr lang="nl-NL" sz="2000" dirty="0"/>
+          </a:p>
+          <a:p>
+            <a:r>
+              <a:rPr lang="nl-NL" sz="2000" dirty="0"/>
+              <a:t>Hoofdredactie de Volkskrant </a:t>
+            </a:r>
+          </a:p>
+          <a:p>
+            <a:r>
+              <a:rPr lang="nl-NL" sz="2000" dirty="0"/>
+              <a:t>Veiligheid op de Volkskrant redactie</a:t>
+            </a:r>
+          </a:p>
+          <a:p>
+            <a:r>
+              <a:rPr lang="nl-NL" sz="2000" dirty="0"/>
+              <a:t>Financiële en emotionele kosten </a:t>
+            </a:r>
+          </a:p>
+          <a:p>
+            <a:endParaRPr lang="nl-NL" sz="2000" dirty="0"/>
+          </a:p>
+          <a:p>
+            <a:endParaRPr lang="nl-NL" sz="2000" dirty="0"/>
+          </a:p>
+          <a:p>
+            <a:pPr marL="0" indent="0">
+              <a:buNone/>
+            </a:pPr>
+            <a:endParaRPr lang="en-US" sz="2400" dirty="0"/>
+          </a:p>
+        </p:txBody>
+      </p:sp>
+      <p:sp>
+        <p:nvSpPr>
+          <p:cNvPr id="4" name="Rectangle: Rounded Corners 3">
+            <a:extLst>
+              <a:ext uri="{FF2B5EF4-FFF2-40B4-BE49-F238E27FC236}">
+                <a16:creationId xmlns:a16="http://schemas.microsoft.com/office/drawing/2014/main" id="{A029AAF1-999B-AD6E-111D-263E4B4FEA16}"/>
+              </a:ext>
+            </a:extLst>
+          </p:cNvPr>
+          <p:cNvSpPr/>
+          <p:nvPr/>
+        </p:nvSpPr>
+        <p:spPr>
+          <a:xfrm>
+            <a:off x="585479" y="909506"/>
+            <a:ext cx="5137744" cy="749939"/>
+          </a:xfrm>
+          <a:prstGeom prst="roundRect">
+            <a:avLst>
+              <a:gd name="adj" fmla="val 50000"/>
+            </a:avLst>
+          </a:prstGeom>
+          <a:solidFill>
+            <a:schemeClr val="tx2">
+              <a:lumMod val="50000"/>
+              <a:lumOff val="50000"/>
+            </a:schemeClr>
+          </a:solidFill>
+          <a:ln>
+            <a:noFill/>
+          </a:ln>
+        </p:spPr>
+        <p:style>
+          <a:lnRef idx="2">
+            <a:schemeClr val="accent1">
+              <a:shade val="15000"/>
+            </a:schemeClr>
+          </a:lnRef>
+          <a:fillRef idx="1">
+            <a:schemeClr val="accent1"/>
+          </a:fillRef>
+          <a:effectRef idx="0">
+            <a:schemeClr val="accent1"/>
+          </a:effectRef>
+          <a:fontRef idx="minor">
+            <a:schemeClr val="lt1"/>
+          </a:fontRef>
+        </p:style>
+        <p:txBody>
+          <a:bodyPr rtlCol="0" anchor="ctr"/>
+          <a:lstStyle/>
+          <a:p>
+            <a:pPr algn="ctr"/>
+            <a:endParaRPr lang="en-US"/>
+          </a:p>
+        </p:txBody>
+      </p:sp>
+      <p:sp>
+        <p:nvSpPr>
+          <p:cNvPr id="5" name="Title 1">
+            <a:extLst>
+              <a:ext uri="{FF2B5EF4-FFF2-40B4-BE49-F238E27FC236}">
+                <a16:creationId xmlns:a16="http://schemas.microsoft.com/office/drawing/2014/main" id="{3A1E058A-6FE5-DC88-409E-865AEBDC4227}"/>
+              </a:ext>
+            </a:extLst>
+          </p:cNvPr>
+          <p:cNvSpPr txBox="1">
+            <a:spLocks/>
+          </p:cNvSpPr>
+          <p:nvPr/>
+        </p:nvSpPr>
+        <p:spPr>
+          <a:xfrm>
+            <a:off x="1032812" y="90675"/>
+            <a:ext cx="9144000" cy="2387600"/>
+          </a:xfrm>
+          <a:prstGeom prst="rect">
+            <a:avLst/>
+          </a:prstGeom>
+        </p:spPr>
+        <p:txBody>
+          <a:bodyPr vert="horz" lIns="91440" tIns="45720" rIns="91440" bIns="45720" rtlCol="0" anchor="ctr">
+            <a:normAutofit/>
+          </a:bodyPr>
+          <a:lstStyle>
+            <a:lvl1pPr algn="l" defTabSz="914400" rtl="0" eaLnBrk="1" latinLnBrk="0" hangingPunct="1">
+              <a:lnSpc>
+                <a:spcPct val="90000"/>
+              </a:lnSpc>
+              <a:spcBef>
+                <a:spcPct val="0"/>
+              </a:spcBef>
+              <a:buNone/>
+              <a:defRPr sz="4400" kern="1200">
+                <a:solidFill>
+                  <a:schemeClr val="tx1"/>
+                </a:solidFill>
+                <a:latin typeface="+mj-lt"/>
+                <a:ea typeface="+mj-ea"/>
+                <a:cs typeface="+mj-cs"/>
+              </a:defRPr>
+            </a:lvl1pPr>
+          </a:lstStyle>
+          <a:p>
+            <a:r>
+              <a:rPr lang="nl-NL" sz="2800" dirty="0">
+                <a:solidFill>
+                  <a:schemeClr val="bg1"/>
+                </a:solidFill>
+                <a:latin typeface="Euclid Circular A Trial Medium" panose="020B0604000000000000" pitchFamily="34" charset="0"/>
+              </a:rPr>
+              <a:t>Werk bij de Volkskrant</a:t>
+            </a:r>
+            <a:endParaRPr lang="en-US" sz="2800" dirty="0">
+              <a:solidFill>
+                <a:schemeClr val="bg1"/>
+              </a:solidFill>
+              <a:latin typeface="Euclid Circular A Trial Medium" panose="020B0604000000000000" pitchFamily="34" charset="0"/>
+            </a:endParaRPr>
+          </a:p>
+        </p:txBody>
+      </p:sp>
+      <p:pic>
+        <p:nvPicPr>
+          <p:cNvPr id="1026" name="Picture 2" descr="When We Dip: Joris Voorn reimagines the classic of Format 'Solid Session'">
+            <a:extLst>
+              <a:ext uri="{FF2B5EF4-FFF2-40B4-BE49-F238E27FC236}">
+                <a16:creationId xmlns:a16="http://schemas.microsoft.com/office/drawing/2014/main" id="{92A945E7-C4BE-6335-0624-1EC331908950}"/>
+              </a:ext>
+            </a:extLst>
+          </p:cNvPr>
+          <p:cNvPicPr>
+            <a:picLocks noChangeAspect="1" noChangeArrowheads="1"/>
+          </p:cNvPicPr>
+          <p:nvPr/>
+        </p:nvPicPr>
+        <p:blipFill>
+          <a:blip r:embed="rId2">
+            <a:extLst>
+              <a:ext uri="{28A0092B-C50C-407E-A947-70E740481C1C}">
+                <a14:useLocalDpi xmlns:a14="http://schemas.microsoft.com/office/drawing/2010/main" val="0"/>
+              </a:ext>
+            </a:extLst>
+          </a:blip>
+          <a:srcRect/>
+          <a:stretch>
+            <a:fillRect/>
+          </a:stretch>
+        </p:blipFill>
+        <p:spPr bwMode="auto">
+          <a:xfrm>
+            <a:off x="8309031" y="1825625"/>
+            <a:ext cx="3044769" cy="3044769"/>
+          </a:xfrm>
+          <a:prstGeom prst="rect">
+            <a:avLst/>
+          </a:prstGeom>
+          <a:noFill/>
+          <a:extLst>
+            <a:ext uri="{909E8E84-426E-40DD-AFC4-6F175D3DCCD1}">
+              <a14:hiddenFill xmlns:a14="http://schemas.microsoft.com/office/drawing/2010/main">
+                <a:solidFill>
+                  <a:srgbClr val="FFFFFF"/>
+                </a:solidFill>
+              </a14:hiddenFill>
+            </a:ext>
+          </a:extLst>
+        </p:spPr>
+      </p:pic>
+      <p:sp>
+        <p:nvSpPr>
+          <p:cNvPr id="6" name="Rectangle 5">
+            <a:extLst>
+              <a:ext uri="{FF2B5EF4-FFF2-40B4-BE49-F238E27FC236}">
+                <a16:creationId xmlns:a16="http://schemas.microsoft.com/office/drawing/2014/main" id="{F92C3A3C-7EB9-4404-4304-037F668507A9}"/>
+              </a:ext>
+            </a:extLst>
+          </p:cNvPr>
+          <p:cNvSpPr/>
+          <p:nvPr/>
+        </p:nvSpPr>
+        <p:spPr>
+          <a:xfrm>
+            <a:off x="8309031" y="4870394"/>
+            <a:ext cx="3044769" cy="513117"/>
+          </a:xfrm>
+          <a:prstGeom prst="rect">
+            <a:avLst/>
+          </a:prstGeom>
+          <a:solidFill>
+            <a:schemeClr val="bg1">
+              <a:lumMod val="85000"/>
+            </a:schemeClr>
+          </a:solidFill>
+          <a:ln>
+            <a:noFill/>
+          </a:ln>
+        </p:spPr>
+        <p:style>
+          <a:lnRef idx="2">
+            <a:schemeClr val="accent1">
+              <a:shade val="15000"/>
+            </a:schemeClr>
+          </a:lnRef>
+          <a:fillRef idx="1">
+            <a:schemeClr val="accent1"/>
+          </a:fillRef>
+          <a:effectRef idx="0">
+            <a:schemeClr val="accent1"/>
+          </a:effectRef>
+          <a:fontRef idx="minor">
+            <a:schemeClr val="lt1"/>
+          </a:fontRef>
+        </p:style>
+        <p:txBody>
+          <a:bodyPr rtlCol="0" anchor="ctr"/>
+          <a:lstStyle/>
+          <a:p>
+            <a:pPr algn="ctr"/>
+            <a:endParaRPr lang="en-US"/>
+          </a:p>
+        </p:txBody>
+      </p:sp>
+      <p:sp>
+        <p:nvSpPr>
+          <p:cNvPr id="7" name="Subtitle 2">
+            <a:extLst>
+              <a:ext uri="{FF2B5EF4-FFF2-40B4-BE49-F238E27FC236}">
+                <a16:creationId xmlns:a16="http://schemas.microsoft.com/office/drawing/2014/main" id="{1F2DE905-609D-4804-041F-20AFB030EF01}"/>
+              </a:ext>
+            </a:extLst>
+          </p:cNvPr>
+          <p:cNvSpPr txBox="1">
+            <a:spLocks/>
+          </p:cNvSpPr>
+          <p:nvPr/>
+        </p:nvSpPr>
+        <p:spPr>
+          <a:xfrm>
+            <a:off x="8309031" y="4983909"/>
+            <a:ext cx="3044769" cy="378179"/>
+          </a:xfrm>
+          <a:prstGeom prst="rect">
+            <a:avLst/>
+          </a:prstGeom>
+        </p:spPr>
+        <p:txBody>
+          <a:bodyPr vert="horz" lIns="91440" tIns="45720" rIns="91440" bIns="45720" rtlCol="0">
+            <a:normAutofit fontScale="85000" lnSpcReduction="20000"/>
+          </a:bodyPr>
+          <a:lstStyle>
+            <a:lvl1pPr marL="228600" indent="-228600" algn="l" defTabSz="914400" rtl="0" eaLnBrk="1" latinLnBrk="0" hangingPunct="1">
+              <a:lnSpc>
+                <a:spcPct val="90000"/>
+              </a:lnSpc>
+              <a:spcBef>
+                <a:spcPts val="1000"/>
+              </a:spcBef>
+              <a:buFont typeface="Arial" panose="020B0604020202020204" pitchFamily="34" charset="0"/>
+              <a:buChar char="•"/>
+              <a:defRPr sz="2800" kern="1200">
+                <a:solidFill>
+                  <a:schemeClr val="tx1"/>
+                </a:solidFill>
+                <a:latin typeface="+mn-lt"/>
+                <a:ea typeface="+mn-ea"/>
+                <a:cs typeface="+mn-cs"/>
+              </a:defRPr>
+            </a:lvl1pPr>
+            <a:lvl2pPr marL="685800" indent="-228600" algn="l" defTabSz="914400" rtl="0" eaLnBrk="1" latinLnBrk="0" hangingPunct="1">
+              <a:lnSpc>
+                <a:spcPct val="90000"/>
+              </a:lnSpc>
+              <a:spcBef>
+                <a:spcPts val="500"/>
+              </a:spcBef>
+              <a:buFont typeface="Arial" panose="020B0604020202020204" pitchFamily="34" charset="0"/>
+              <a:buChar char="•"/>
+              <a:defRPr sz="2400" kern="1200">
+                <a:solidFill>
+                  <a:schemeClr val="tx1"/>
+                </a:solidFill>
+                <a:latin typeface="+mn-lt"/>
+                <a:ea typeface="+mn-ea"/>
+                <a:cs typeface="+mn-cs"/>
+              </a:defRPr>
+            </a:lvl2pPr>
+            <a:lvl3pPr marL="1143000" indent="-228600" algn="l" defTabSz="914400" rtl="0" eaLnBrk="1" latinLnBrk="0" hangingPunct="1">
+              <a:lnSpc>
+                <a:spcPct val="90000"/>
+              </a:lnSpc>
+              <a:spcBef>
+                <a:spcPts val="500"/>
+              </a:spcBef>
+              <a:buFont typeface="Arial" panose="020B0604020202020204" pitchFamily="34" charset="0"/>
+              <a:buChar char="•"/>
+              <a:defRPr sz="2000" kern="1200">
+                <a:solidFill>
+                  <a:schemeClr val="tx1"/>
+                </a:solidFill>
+                <a:latin typeface="+mn-lt"/>
+                <a:ea typeface="+mn-ea"/>
+                <a:cs typeface="+mn-cs"/>
+              </a:defRPr>
+            </a:lvl3pPr>
+            <a:lvl4pPr marL="1600200" indent="-228600" algn="l" defTabSz="914400" rtl="0" eaLnBrk="1" latinLnBrk="0" hangingPunct="1">
+              <a:lnSpc>
+                <a:spcPct val="90000"/>
+              </a:lnSpc>
+              <a:spcBef>
+                <a:spcPts val="500"/>
+              </a:spcBef>
+              <a:buFont typeface="Arial" panose="020B0604020202020204" pitchFamily="34" charset="0"/>
+              <a:buChar char="•"/>
+              <a:defRPr sz="1800" kern="1200">
+                <a:solidFill>
+                  <a:schemeClr val="tx1"/>
+                </a:solidFill>
+                <a:latin typeface="+mn-lt"/>
+                <a:ea typeface="+mn-ea"/>
+                <a:cs typeface="+mn-cs"/>
+              </a:defRPr>
+            </a:lvl4pPr>
+            <a:lvl5pPr marL="2057400" indent="-228600" algn="l" defTabSz="914400" rtl="0" eaLnBrk="1" latinLnBrk="0" hangingPunct="1">
+              <a:lnSpc>
+                <a:spcPct val="90000"/>
+              </a:lnSpc>
+              <a:spcBef>
+                <a:spcPts val="500"/>
+              </a:spcBef>
+              <a:buFont typeface="Arial" panose="020B0604020202020204" pitchFamily="34" charset="0"/>
+              <a:buChar char="•"/>
+              <a:defRPr sz="1800" kern="1200">
+                <a:solidFill>
+                  <a:schemeClr val="tx1"/>
+                </a:solidFill>
+                <a:latin typeface="+mn-lt"/>
+                <a:ea typeface="+mn-ea"/>
+                <a:cs typeface="+mn-cs"/>
+              </a:defRPr>
+            </a:lvl5pPr>
+            <a:lvl6pPr marL="2514600" indent="-228600" algn="l" defTabSz="914400" rtl="0" eaLnBrk="1" latinLnBrk="0" hangingPunct="1">
+              <a:lnSpc>
+                <a:spcPct val="90000"/>
+              </a:lnSpc>
+              <a:spcBef>
+                <a:spcPts val="500"/>
+              </a:spcBef>
+              <a:buFont typeface="Arial" panose="020B0604020202020204" pitchFamily="34" charset="0"/>
+              <a:buChar char="•"/>
+              <a:defRPr sz="1800" kern="1200">
+                <a:solidFill>
+                  <a:schemeClr val="tx1"/>
+                </a:solidFill>
+                <a:latin typeface="+mn-lt"/>
+                <a:ea typeface="+mn-ea"/>
+                <a:cs typeface="+mn-cs"/>
+              </a:defRPr>
+            </a:lvl6pPr>
+            <a:lvl7pPr marL="2971800" indent="-228600" algn="l" defTabSz="914400" rtl="0" eaLnBrk="1" latinLnBrk="0" hangingPunct="1">
+              <a:lnSpc>
+                <a:spcPct val="90000"/>
+              </a:lnSpc>
+              <a:spcBef>
+                <a:spcPts val="500"/>
+              </a:spcBef>
+              <a:buFont typeface="Arial" panose="020B0604020202020204" pitchFamily="34" charset="0"/>
+              <a:buChar char="•"/>
+              <a:defRPr sz="1800" kern="1200">
+                <a:solidFill>
+                  <a:schemeClr val="tx1"/>
+                </a:solidFill>
+                <a:latin typeface="+mn-lt"/>
+                <a:ea typeface="+mn-ea"/>
+                <a:cs typeface="+mn-cs"/>
+              </a:defRPr>
+            </a:lvl7pPr>
+            <a:lvl8pPr marL="3429000" indent="-228600" algn="l" defTabSz="914400" rtl="0" eaLnBrk="1" latinLnBrk="0" hangingPunct="1">
+              <a:lnSpc>
+                <a:spcPct val="90000"/>
+              </a:lnSpc>
+              <a:spcBef>
+                <a:spcPts val="500"/>
+              </a:spcBef>
+              <a:buFont typeface="Arial" panose="020B0604020202020204" pitchFamily="34" charset="0"/>
+              <a:buChar char="•"/>
+              <a:defRPr sz="1800" kern="1200">
+                <a:solidFill>
+                  <a:schemeClr val="tx1"/>
+                </a:solidFill>
+                <a:latin typeface="+mn-lt"/>
+                <a:ea typeface="+mn-ea"/>
+                <a:cs typeface="+mn-cs"/>
+              </a:defRPr>
+            </a:lvl8pPr>
+            <a:lvl9pPr marL="3886200" indent="-228600" algn="l" defTabSz="914400" rtl="0" eaLnBrk="1" latinLnBrk="0" hangingPunct="1">
+              <a:lnSpc>
+                <a:spcPct val="90000"/>
+              </a:lnSpc>
+              <a:spcBef>
+                <a:spcPts val="500"/>
+              </a:spcBef>
+              <a:buFont typeface="Arial" panose="020B0604020202020204" pitchFamily="34" charset="0"/>
+              <a:buChar char="•"/>
+              <a:defRPr sz="1800" kern="1200">
+                <a:solidFill>
+                  <a:schemeClr val="tx1"/>
+                </a:solidFill>
+                <a:latin typeface="+mn-lt"/>
+                <a:ea typeface="+mn-ea"/>
+                <a:cs typeface="+mn-cs"/>
+              </a:defRPr>
+            </a:lvl9pPr>
+          </a:lstStyle>
+          <a:p>
+            <a:pPr marL="0" indent="0" algn="ctr">
+              <a:buNone/>
+            </a:pPr>
+            <a:r>
+              <a:rPr lang="nl-NL" dirty="0">
+                <a:latin typeface="Euclid Circular A Trial Light" panose="020B0304000000000000" pitchFamily="34" charset="0"/>
+                <a:ea typeface="HGSSoeiKakugothicUB" panose="020B0400000000000000" pitchFamily="34" charset="-128"/>
+              </a:rPr>
+              <a:t> Marije </a:t>
+            </a:r>
+            <a:r>
+              <a:rPr lang="nl-NL" dirty="0" err="1">
+                <a:latin typeface="Euclid Circular A Trial Light" panose="020B0304000000000000" pitchFamily="34" charset="0"/>
+                <a:ea typeface="HGSSoeiKakugothicUB" panose="020B0400000000000000" pitchFamily="34" charset="-128"/>
+              </a:rPr>
+              <a:t>Randewijk</a:t>
+            </a:r>
+            <a:r>
+              <a:rPr lang="nl-NL" dirty="0">
+                <a:latin typeface="Euclid Circular A Trial Light" panose="020B0304000000000000" pitchFamily="34" charset="0"/>
+                <a:ea typeface="HGSSoeiKakugothicUB" panose="020B0400000000000000" pitchFamily="34" charset="-128"/>
+              </a:rPr>
+              <a:t> </a:t>
+            </a:r>
+          </a:p>
+        </p:txBody>
+      </p:sp>
+      <p:pic>
+        <p:nvPicPr>
+          <p:cNvPr id="2052" name="Picture 4">
+            <a:extLst>
+              <a:ext uri="{FF2B5EF4-FFF2-40B4-BE49-F238E27FC236}">
+                <a16:creationId xmlns:a16="http://schemas.microsoft.com/office/drawing/2014/main" id="{FEBBF7C3-AAE5-05AC-6035-E53FF89895CC}"/>
+              </a:ext>
+            </a:extLst>
+          </p:cNvPr>
+          <p:cNvPicPr>
+            <a:picLocks noChangeAspect="1" noChangeArrowheads="1"/>
+          </p:cNvPicPr>
+          <p:nvPr/>
+        </p:nvPicPr>
+        <p:blipFill rotWithShape="1">
+          <a:blip r:embed="rId3">
+            <a:extLst>
+              <a:ext uri="{28A0092B-C50C-407E-A947-70E740481C1C}">
+                <a14:useLocalDpi xmlns:a14="http://schemas.microsoft.com/office/drawing/2010/main" val="0"/>
+              </a:ext>
+            </a:extLst>
+          </a:blip>
+          <a:srcRect l="25371" r="20364"/>
+          <a:stretch/>
+        </p:blipFill>
+        <p:spPr bwMode="auto">
+          <a:xfrm>
+            <a:off x="8304520" y="1690688"/>
+            <a:ext cx="3049279" cy="3184226"/>
+          </a:xfrm>
+          <a:prstGeom prst="rect">
+            <a:avLst/>
+          </a:prstGeom>
+          <a:noFill/>
+          <a:extLst>
+            <a:ext uri="{909E8E84-426E-40DD-AFC4-6F175D3DCCD1}">
+              <a14:hiddenFill xmlns:a14="http://schemas.microsoft.com/office/drawing/2010/main">
+                <a:solidFill>
+                  <a:srgbClr val="FFFFFF"/>
+                </a:solidFill>
+              </a14:hiddenFill>
+            </a:ext>
+          </a:extLst>
+        </p:spPr>
+      </p:pic>
+    </p:spTree>
+    <p:extLst>
+      <p:ext uri="{BB962C8B-B14F-4D97-AF65-F5344CB8AC3E}">
+        <p14:creationId xmlns:p14="http://schemas.microsoft.com/office/powerpoint/2010/main" val="611523719"/>
+      </p:ext>
+    </p:extLst>
+  </p:cSld>
+  <p:clrMapOvr>
+    <a:masterClrMapping/>
+  </p:clrMapOvr>
+</p:sld>
+</file>
+
+<file path=ppt/slides/slide5.xml><?xml version="1.0" encoding="utf-8"?>
+<p:sld xmlns:a="http://schemas.openxmlformats.org/drawingml/2006/main" xmlns:r="http://schemas.openxmlformats.org/officeDocument/2006/relationships" xmlns:p="http://schemas.openxmlformats.org/presentationml/2006/main">
+  <p:cSld>
+    <p:spTree>
+      <p:nvGrpSpPr>
+        <p:cNvPr id="1" name=""/>
+        <p:cNvGrpSpPr/>
+        <p:nvPr/>
+      </p:nvGrpSpPr>
+      <p:grpSpPr>
+        <a:xfrm>
+          <a:off x="0" y="0"/>
+          <a:ext cx="0" cy="0"/>
+          <a:chOff x="0" y="0"/>
+          <a:chExt cx="0" cy="0"/>
+        </a:xfrm>
+      </p:grpSpPr>
+      <p:sp>
+        <p:nvSpPr>
+          <p:cNvPr id="2" name="Title 1">
+            <a:extLst>
+              <a:ext uri="{FF2B5EF4-FFF2-40B4-BE49-F238E27FC236}">
+                <a16:creationId xmlns:a16="http://schemas.microsoft.com/office/drawing/2014/main" id="{16035FBD-A672-D45A-696A-18CDD6E8A1D9}"/>
+              </a:ext>
+            </a:extLst>
+          </p:cNvPr>
+          <p:cNvSpPr>
+            <a:spLocks noGrp="1"/>
+          </p:cNvSpPr>
+          <p:nvPr>
+            <p:ph type="title"/>
+          </p:nvPr>
+        </p:nvSpPr>
+        <p:spPr/>
+        <p:txBody>
+          <a:bodyPr/>
+          <a:lstStyle/>
+          <a:p>
+            <a:endParaRPr lang="en-US" dirty="0"/>
+          </a:p>
+        </p:txBody>
+      </p:sp>
+      <p:sp>
+        <p:nvSpPr>
+          <p:cNvPr id="3" name="Content Placeholder 2">
+            <a:extLst>
+              <a:ext uri="{FF2B5EF4-FFF2-40B4-BE49-F238E27FC236}">
+                <a16:creationId xmlns:a16="http://schemas.microsoft.com/office/drawing/2014/main" id="{A372109C-CA95-222F-0F97-CB76EFF8A2D5}"/>
+              </a:ext>
+            </a:extLst>
+          </p:cNvPr>
+          <p:cNvSpPr>
+            <a:spLocks noGrp="1"/>
+          </p:cNvSpPr>
+          <p:nvPr>
+            <p:ph idx="1"/>
+          </p:nvPr>
+        </p:nvSpPr>
+        <p:spPr/>
+        <p:txBody>
+          <a:bodyPr>
+            <a:normAutofit fontScale="85000" lnSpcReduction="20000"/>
+          </a:bodyPr>
+          <a:lstStyle/>
+          <a:p>
+            <a:pPr marL="0" indent="0">
+              <a:buNone/>
+            </a:pPr>
+            <a:endParaRPr lang="nl-NL" dirty="0"/>
+          </a:p>
+          <a:p>
+            <a:pPr marL="0" indent="0">
+              <a:buNone/>
+            </a:pPr>
+            <a:r>
+              <a:rPr lang="en-US" dirty="0" err="1"/>
+              <a:t>Vinden</a:t>
+            </a:r>
+            <a:endParaRPr lang="en-US" dirty="0"/>
+          </a:p>
+          <a:p>
+            <a:pPr marL="0" indent="0">
+              <a:buNone/>
+            </a:pPr>
+            <a:r>
+              <a:rPr lang="nl-NL" sz="1400" dirty="0"/>
+              <a:t>Ministerie van Binnenlandse Zaken en Koninkrijksrelaties</a:t>
+            </a:r>
+          </a:p>
+          <a:p>
+            <a:pPr marL="0" indent="0">
+              <a:buNone/>
+            </a:pPr>
+            <a:r>
+              <a:rPr lang="nl-NL" sz="1400" dirty="0"/>
+              <a:t>Postbus 20010</a:t>
+            </a:r>
+          </a:p>
+          <a:p>
+            <a:pPr marL="0" indent="0">
+              <a:buNone/>
+            </a:pPr>
+            <a:r>
+              <a:rPr lang="nl-NL" sz="1400" dirty="0"/>
+              <a:t>2500 EA Den Haag</a:t>
+            </a:r>
+          </a:p>
+          <a:p>
+            <a:pPr marL="0" indent="0">
+              <a:buNone/>
+            </a:pPr>
+            <a:r>
+              <a:rPr lang="en-US" sz="1900" dirty="0" err="1"/>
+              <a:t>Telefoonnummer</a:t>
+            </a:r>
+            <a:r>
+              <a:rPr lang="en-US" sz="1900" dirty="0"/>
+              <a:t>: </a:t>
+            </a:r>
+            <a:r>
+              <a:rPr lang="en-US" sz="1900" dirty="0">
+                <a:hlinkClick r:id="rId2">
+                  <a:extLst>
+                    <a:ext uri="{A12FA001-AC4F-418D-AE19-62706E023703}">
+                      <ahyp:hlinkClr xmlns:ahyp="http://schemas.microsoft.com/office/drawing/2018/hyperlinkcolor" val="tx"/>
+                    </a:ext>
+                  </a:extLst>
+                </a:hlinkClick>
+              </a:rPr>
+              <a:t>079-320 50 50</a:t>
+            </a:r>
+            <a:endParaRPr lang="en-US" sz="1900" dirty="0"/>
+          </a:p>
+          <a:p>
+            <a:pPr marL="0" indent="0">
+              <a:buNone/>
+            </a:pPr>
+            <a:endParaRPr lang="en-US" sz="1900" dirty="0"/>
+          </a:p>
+          <a:p>
+            <a:pPr marL="0" indent="0">
+              <a:buNone/>
+            </a:pPr>
+            <a:r>
+              <a:rPr lang="en-US" sz="1400" dirty="0"/>
+              <a:t>Emma &gt; Jan </a:t>
+            </a:r>
+            <a:r>
+              <a:rPr lang="en-US" sz="1400" dirty="0" err="1"/>
+              <a:t>Struijs</a:t>
+            </a:r>
+            <a:r>
+              <a:rPr lang="en-US" sz="1400" dirty="0"/>
+              <a:t> &gt; Erik </a:t>
+            </a:r>
+            <a:r>
+              <a:rPr lang="en-US" sz="1400" dirty="0" err="1"/>
+              <a:t>Akerboom</a:t>
+            </a:r>
+            <a:endParaRPr lang="en-US" sz="1400" dirty="0"/>
+          </a:p>
+          <a:p>
+            <a:pPr marL="0" indent="0">
+              <a:buNone/>
+            </a:pPr>
+            <a:endParaRPr lang="en-US" sz="1400" dirty="0"/>
+          </a:p>
+          <a:p>
+            <a:pPr marL="0" indent="0">
+              <a:buNone/>
+            </a:pPr>
+            <a:r>
+              <a:rPr lang="en-US" dirty="0" err="1"/>
+              <a:t>Inhoud</a:t>
+            </a:r>
+            <a:r>
+              <a:rPr lang="en-US" dirty="0"/>
+              <a:t> video:</a:t>
+            </a:r>
+            <a:endParaRPr lang="nl-NL" sz="2000" dirty="0"/>
+          </a:p>
+          <a:p>
+            <a:r>
+              <a:rPr lang="nl-NL" sz="2000" dirty="0"/>
+              <a:t>Hoofd AIVD </a:t>
+            </a:r>
+          </a:p>
+          <a:p>
+            <a:r>
+              <a:rPr lang="nl-NL" sz="2000" dirty="0"/>
+              <a:t>Belangenverstrengeling</a:t>
+            </a:r>
+          </a:p>
+          <a:p>
+            <a:r>
+              <a:rPr lang="nl-NL" sz="2000" dirty="0"/>
+              <a:t>Wat vindt Erik ervan?</a:t>
+            </a:r>
+          </a:p>
+          <a:p>
+            <a:r>
+              <a:rPr lang="nl-NL" sz="2000" dirty="0"/>
+              <a:t>Lekken AIVD</a:t>
+            </a:r>
+          </a:p>
+          <a:p>
+            <a:endParaRPr lang="nl-NL" sz="2000" dirty="0"/>
+          </a:p>
+          <a:p>
+            <a:endParaRPr lang="nl-NL" sz="2000" dirty="0"/>
+          </a:p>
+          <a:p>
+            <a:pPr marL="0" indent="0">
+              <a:buNone/>
+            </a:pPr>
+            <a:endParaRPr lang="en-US" sz="2400" dirty="0"/>
+          </a:p>
+        </p:txBody>
+      </p:sp>
+      <p:sp>
+        <p:nvSpPr>
+          <p:cNvPr id="4" name="Rectangle: Rounded Corners 3">
+            <a:extLst>
+              <a:ext uri="{FF2B5EF4-FFF2-40B4-BE49-F238E27FC236}">
+                <a16:creationId xmlns:a16="http://schemas.microsoft.com/office/drawing/2014/main" id="{A029AAF1-999B-AD6E-111D-263E4B4FEA16}"/>
+              </a:ext>
+            </a:extLst>
+          </p:cNvPr>
+          <p:cNvSpPr/>
+          <p:nvPr/>
+        </p:nvSpPr>
+        <p:spPr>
+          <a:xfrm>
+            <a:off x="585479" y="909506"/>
+            <a:ext cx="5137744" cy="749939"/>
+          </a:xfrm>
+          <a:prstGeom prst="roundRect">
+            <a:avLst>
+              <a:gd name="adj" fmla="val 50000"/>
+            </a:avLst>
+          </a:prstGeom>
+          <a:solidFill>
+            <a:schemeClr val="tx2">
+              <a:lumMod val="50000"/>
+              <a:lumOff val="50000"/>
+            </a:schemeClr>
+          </a:solidFill>
+          <a:ln>
+            <a:noFill/>
+          </a:ln>
+        </p:spPr>
+        <p:style>
+          <a:lnRef idx="2">
+            <a:schemeClr val="accent1">
+              <a:shade val="15000"/>
+            </a:schemeClr>
+          </a:lnRef>
+          <a:fillRef idx="1">
+            <a:schemeClr val="accent1"/>
+          </a:fillRef>
+          <a:effectRef idx="0">
+            <a:schemeClr val="accent1"/>
+          </a:effectRef>
+          <a:fontRef idx="minor">
+            <a:schemeClr val="lt1"/>
+          </a:fontRef>
+        </p:style>
+        <p:txBody>
+          <a:bodyPr rtlCol="0" anchor="ctr"/>
+          <a:lstStyle/>
+          <a:p>
+            <a:pPr algn="ctr"/>
+            <a:endParaRPr lang="en-US"/>
+          </a:p>
+        </p:txBody>
+      </p:sp>
+      <p:sp>
+        <p:nvSpPr>
+          <p:cNvPr id="5" name="Title 1">
+            <a:extLst>
+              <a:ext uri="{FF2B5EF4-FFF2-40B4-BE49-F238E27FC236}">
+                <a16:creationId xmlns:a16="http://schemas.microsoft.com/office/drawing/2014/main" id="{3A1E058A-6FE5-DC88-409E-865AEBDC4227}"/>
+              </a:ext>
+            </a:extLst>
+          </p:cNvPr>
+          <p:cNvSpPr txBox="1">
+            <a:spLocks/>
+          </p:cNvSpPr>
+          <p:nvPr/>
+        </p:nvSpPr>
+        <p:spPr>
+          <a:xfrm>
+            <a:off x="1032812" y="90675"/>
+            <a:ext cx="9144000" cy="2387600"/>
+          </a:xfrm>
+          <a:prstGeom prst="rect">
+            <a:avLst/>
+          </a:prstGeom>
+        </p:spPr>
+        <p:txBody>
+          <a:bodyPr vert="horz" lIns="91440" tIns="45720" rIns="91440" bIns="45720" rtlCol="0" anchor="ctr">
+            <a:normAutofit/>
+          </a:bodyPr>
+          <a:lstStyle>
+            <a:lvl1pPr algn="l" defTabSz="914400" rtl="0" eaLnBrk="1" latinLnBrk="0" hangingPunct="1">
+              <a:lnSpc>
+                <a:spcPct val="90000"/>
+              </a:lnSpc>
+              <a:spcBef>
+                <a:spcPct val="0"/>
+              </a:spcBef>
+              <a:buNone/>
+              <a:defRPr sz="4400" kern="1200">
+                <a:solidFill>
+                  <a:schemeClr val="tx1"/>
+                </a:solidFill>
+                <a:latin typeface="+mj-lt"/>
+                <a:ea typeface="+mj-ea"/>
+                <a:cs typeface="+mj-cs"/>
+              </a:defRPr>
+            </a:lvl1pPr>
+          </a:lstStyle>
+          <a:p>
+            <a:r>
+              <a:rPr lang="nl-NL" sz="2800" dirty="0">
+                <a:solidFill>
+                  <a:schemeClr val="bg1"/>
+                </a:solidFill>
+                <a:latin typeface="Euclid Circular A Trial Medium" panose="020B0604000000000000" pitchFamily="34" charset="0"/>
+              </a:rPr>
+              <a:t>Werk bij de Volkskrant</a:t>
+            </a:r>
+            <a:endParaRPr lang="en-US" sz="2800" dirty="0">
+              <a:solidFill>
+                <a:schemeClr val="bg1"/>
+              </a:solidFill>
+              <a:latin typeface="Euclid Circular A Trial Medium" panose="020B0604000000000000" pitchFamily="34" charset="0"/>
+            </a:endParaRPr>
+          </a:p>
+        </p:txBody>
+      </p:sp>
+      <p:sp>
+        <p:nvSpPr>
+          <p:cNvPr id="6" name="Rectangle 5">
+            <a:extLst>
+              <a:ext uri="{FF2B5EF4-FFF2-40B4-BE49-F238E27FC236}">
+                <a16:creationId xmlns:a16="http://schemas.microsoft.com/office/drawing/2014/main" id="{F92C3A3C-7EB9-4404-4304-037F668507A9}"/>
+              </a:ext>
+            </a:extLst>
+          </p:cNvPr>
+          <p:cNvSpPr/>
+          <p:nvPr/>
+        </p:nvSpPr>
+        <p:spPr>
+          <a:xfrm>
+            <a:off x="8309031" y="4870394"/>
+            <a:ext cx="3044769" cy="513117"/>
+          </a:xfrm>
+          <a:prstGeom prst="rect">
+            <a:avLst/>
+          </a:prstGeom>
+          <a:solidFill>
+            <a:schemeClr val="bg1">
+              <a:lumMod val="85000"/>
+            </a:schemeClr>
+          </a:solidFill>
+          <a:ln>
+            <a:noFill/>
+          </a:ln>
+        </p:spPr>
+        <p:style>
+          <a:lnRef idx="2">
+            <a:schemeClr val="accent1">
+              <a:shade val="15000"/>
+            </a:schemeClr>
+          </a:lnRef>
+          <a:fillRef idx="1">
+            <a:schemeClr val="accent1"/>
+          </a:fillRef>
+          <a:effectRef idx="0">
+            <a:schemeClr val="accent1"/>
+          </a:effectRef>
+          <a:fontRef idx="minor">
+            <a:schemeClr val="lt1"/>
+          </a:fontRef>
+        </p:style>
+        <p:txBody>
+          <a:bodyPr rtlCol="0" anchor="ctr"/>
+          <a:lstStyle/>
+          <a:p>
+            <a:pPr algn="ctr"/>
+            <a:endParaRPr lang="en-US"/>
+          </a:p>
+        </p:txBody>
+      </p:sp>
+      <p:sp>
+        <p:nvSpPr>
+          <p:cNvPr id="7" name="Subtitle 2">
+            <a:extLst>
+              <a:ext uri="{FF2B5EF4-FFF2-40B4-BE49-F238E27FC236}">
+                <a16:creationId xmlns:a16="http://schemas.microsoft.com/office/drawing/2014/main" id="{1F2DE905-609D-4804-041F-20AFB030EF01}"/>
+              </a:ext>
+            </a:extLst>
+          </p:cNvPr>
+          <p:cNvSpPr txBox="1">
+            <a:spLocks/>
+          </p:cNvSpPr>
+          <p:nvPr/>
+        </p:nvSpPr>
+        <p:spPr>
+          <a:xfrm>
+            <a:off x="8309031" y="4983909"/>
+            <a:ext cx="3044769" cy="378179"/>
+          </a:xfrm>
+          <a:prstGeom prst="rect">
+            <a:avLst/>
+          </a:prstGeom>
+        </p:spPr>
+        <p:txBody>
+          <a:bodyPr vert="horz" lIns="91440" tIns="45720" rIns="91440" bIns="45720" rtlCol="0">
+            <a:normAutofit fontScale="85000" lnSpcReduction="20000"/>
+          </a:bodyPr>
+          <a:lstStyle>
+            <a:lvl1pPr marL="228600" indent="-228600" algn="l" defTabSz="914400" rtl="0" eaLnBrk="1" latinLnBrk="0" hangingPunct="1">
+              <a:lnSpc>
+                <a:spcPct val="90000"/>
+              </a:lnSpc>
+              <a:spcBef>
+                <a:spcPts val="1000"/>
+              </a:spcBef>
+              <a:buFont typeface="Arial" panose="020B0604020202020204" pitchFamily="34" charset="0"/>
+              <a:buChar char="•"/>
+              <a:defRPr sz="2800" kern="1200">
+                <a:solidFill>
+                  <a:schemeClr val="tx1"/>
+                </a:solidFill>
+                <a:latin typeface="+mn-lt"/>
+                <a:ea typeface="+mn-ea"/>
+                <a:cs typeface="+mn-cs"/>
+              </a:defRPr>
+            </a:lvl1pPr>
+            <a:lvl2pPr marL="685800" indent="-228600" algn="l" defTabSz="914400" rtl="0" eaLnBrk="1" latinLnBrk="0" hangingPunct="1">
+              <a:lnSpc>
+                <a:spcPct val="90000"/>
+              </a:lnSpc>
+              <a:spcBef>
+                <a:spcPts val="500"/>
+              </a:spcBef>
+              <a:buFont typeface="Arial" panose="020B0604020202020204" pitchFamily="34" charset="0"/>
+              <a:buChar char="•"/>
+              <a:defRPr sz="2400" kern="1200">
+                <a:solidFill>
+                  <a:schemeClr val="tx1"/>
+                </a:solidFill>
+                <a:latin typeface="+mn-lt"/>
+                <a:ea typeface="+mn-ea"/>
+                <a:cs typeface="+mn-cs"/>
+              </a:defRPr>
+            </a:lvl2pPr>
+            <a:lvl3pPr marL="1143000" indent="-228600" algn="l" defTabSz="914400" rtl="0" eaLnBrk="1" latinLnBrk="0" hangingPunct="1">
+              <a:lnSpc>
+                <a:spcPct val="90000"/>
+              </a:lnSpc>
+              <a:spcBef>
+                <a:spcPts val="500"/>
+              </a:spcBef>
+              <a:buFont typeface="Arial" panose="020B0604020202020204" pitchFamily="34" charset="0"/>
+              <a:buChar char="•"/>
+              <a:defRPr sz="2000" kern="1200">
+                <a:solidFill>
+                  <a:schemeClr val="tx1"/>
+                </a:solidFill>
+                <a:latin typeface="+mn-lt"/>
+                <a:ea typeface="+mn-ea"/>
+                <a:cs typeface="+mn-cs"/>
+              </a:defRPr>
+            </a:lvl3pPr>
+            <a:lvl4pPr marL="1600200" indent="-228600" algn="l" defTabSz="914400" rtl="0" eaLnBrk="1" latinLnBrk="0" hangingPunct="1">
+              <a:lnSpc>
+                <a:spcPct val="90000"/>
+              </a:lnSpc>
+              <a:spcBef>
+                <a:spcPts val="500"/>
+              </a:spcBef>
+              <a:buFont typeface="Arial" panose="020B0604020202020204" pitchFamily="34" charset="0"/>
+              <a:buChar char="•"/>
+              <a:defRPr sz="1800" kern="1200">
+                <a:solidFill>
+                  <a:schemeClr val="tx1"/>
+                </a:solidFill>
+                <a:latin typeface="+mn-lt"/>
+                <a:ea typeface="+mn-ea"/>
+                <a:cs typeface="+mn-cs"/>
+              </a:defRPr>
+            </a:lvl4pPr>
+            <a:lvl5pPr marL="2057400" indent="-228600" algn="l" defTabSz="914400" rtl="0" eaLnBrk="1" latinLnBrk="0" hangingPunct="1">
+              <a:lnSpc>
+                <a:spcPct val="90000"/>
+              </a:lnSpc>
+              <a:spcBef>
+                <a:spcPts val="500"/>
+              </a:spcBef>
+              <a:buFont typeface="Arial" panose="020B0604020202020204" pitchFamily="34" charset="0"/>
+              <a:buChar char="•"/>
+              <a:defRPr sz="1800" kern="1200">
+                <a:solidFill>
+                  <a:schemeClr val="tx1"/>
+                </a:solidFill>
+                <a:latin typeface="+mn-lt"/>
+                <a:ea typeface="+mn-ea"/>
+                <a:cs typeface="+mn-cs"/>
+              </a:defRPr>
+            </a:lvl5pPr>
+            <a:lvl6pPr marL="2514600" indent="-228600" algn="l" defTabSz="914400" rtl="0" eaLnBrk="1" latinLnBrk="0" hangingPunct="1">
+              <a:lnSpc>
+                <a:spcPct val="90000"/>
+              </a:lnSpc>
+              <a:spcBef>
+                <a:spcPts val="500"/>
+              </a:spcBef>
+              <a:buFont typeface="Arial" panose="020B0604020202020204" pitchFamily="34" charset="0"/>
+              <a:buChar char="•"/>
+              <a:defRPr sz="1800" kern="1200">
+                <a:solidFill>
+                  <a:schemeClr val="tx1"/>
+                </a:solidFill>
+                <a:latin typeface="+mn-lt"/>
+                <a:ea typeface="+mn-ea"/>
+                <a:cs typeface="+mn-cs"/>
+              </a:defRPr>
+            </a:lvl6pPr>
+            <a:lvl7pPr marL="2971800" indent="-228600" algn="l" defTabSz="914400" rtl="0" eaLnBrk="1" latinLnBrk="0" hangingPunct="1">
+              <a:lnSpc>
+                <a:spcPct val="90000"/>
+              </a:lnSpc>
+              <a:spcBef>
+                <a:spcPts val="500"/>
+              </a:spcBef>
+              <a:buFont typeface="Arial" panose="020B0604020202020204" pitchFamily="34" charset="0"/>
+              <a:buChar char="•"/>
+              <a:defRPr sz="1800" kern="1200">
+                <a:solidFill>
+                  <a:schemeClr val="tx1"/>
+                </a:solidFill>
+                <a:latin typeface="+mn-lt"/>
+                <a:ea typeface="+mn-ea"/>
+                <a:cs typeface="+mn-cs"/>
+              </a:defRPr>
+            </a:lvl7pPr>
+            <a:lvl8pPr marL="3429000" indent="-228600" algn="l" defTabSz="914400" rtl="0" eaLnBrk="1" latinLnBrk="0" hangingPunct="1">
+              <a:lnSpc>
+                <a:spcPct val="90000"/>
+              </a:lnSpc>
+              <a:spcBef>
+                <a:spcPts val="500"/>
+              </a:spcBef>
+              <a:buFont typeface="Arial" panose="020B0604020202020204" pitchFamily="34" charset="0"/>
+              <a:buChar char="•"/>
+              <a:defRPr sz="1800" kern="1200">
+                <a:solidFill>
+                  <a:schemeClr val="tx1"/>
+                </a:solidFill>
+                <a:latin typeface="+mn-lt"/>
+                <a:ea typeface="+mn-ea"/>
+                <a:cs typeface="+mn-cs"/>
+              </a:defRPr>
+            </a:lvl8pPr>
+            <a:lvl9pPr marL="3886200" indent="-228600" algn="l" defTabSz="914400" rtl="0" eaLnBrk="1" latinLnBrk="0" hangingPunct="1">
+              <a:lnSpc>
+                <a:spcPct val="90000"/>
+              </a:lnSpc>
+              <a:spcBef>
+                <a:spcPts val="500"/>
+              </a:spcBef>
+              <a:buFont typeface="Arial" panose="020B0604020202020204" pitchFamily="34" charset="0"/>
+              <a:buChar char="•"/>
+              <a:defRPr sz="1800" kern="1200">
+                <a:solidFill>
+                  <a:schemeClr val="tx1"/>
+                </a:solidFill>
+                <a:latin typeface="+mn-lt"/>
+                <a:ea typeface="+mn-ea"/>
+                <a:cs typeface="+mn-cs"/>
+              </a:defRPr>
+            </a:lvl9pPr>
+          </a:lstStyle>
+          <a:p>
+            <a:pPr marL="0" indent="0" algn="ctr">
+              <a:buNone/>
+            </a:pPr>
+            <a:r>
+              <a:rPr lang="nl-NL" dirty="0">
+                <a:latin typeface="Euclid Circular A Trial Light" panose="020B0304000000000000" pitchFamily="34" charset="0"/>
+                <a:ea typeface="HGSSoeiKakugothicUB" panose="020B0400000000000000" pitchFamily="34" charset="-128"/>
+              </a:rPr>
+              <a:t> Erik Akerboom</a:t>
+            </a:r>
+          </a:p>
+        </p:txBody>
+      </p:sp>
+      <p:pic>
+        <p:nvPicPr>
+          <p:cNvPr id="3074" name="Picture 2" descr="Operatie Interview – Erik Akerboom - De Balie">
+            <a:extLst>
+              <a:ext uri="{FF2B5EF4-FFF2-40B4-BE49-F238E27FC236}">
+                <a16:creationId xmlns:a16="http://schemas.microsoft.com/office/drawing/2014/main" id="{4C9943AE-CF43-7E46-EB5E-4B057F96A5FB}"/>
+              </a:ext>
+            </a:extLst>
+          </p:cNvPr>
+          <p:cNvPicPr>
+            <a:picLocks noChangeAspect="1" noChangeArrowheads="1"/>
+          </p:cNvPicPr>
+          <p:nvPr/>
+        </p:nvPicPr>
+        <p:blipFill rotWithShape="1">
+          <a:blip r:embed="rId3">
+            <a:extLst>
+              <a:ext uri="{28A0092B-C50C-407E-A947-70E740481C1C}">
+                <a14:useLocalDpi xmlns:a14="http://schemas.microsoft.com/office/drawing/2010/main" val="0"/>
+              </a:ext>
+            </a:extLst>
+          </a:blip>
+          <a:srcRect l="15133" r="10858"/>
+          <a:stretch/>
+        </p:blipFill>
+        <p:spPr bwMode="auto">
+          <a:xfrm>
+            <a:off x="8304520" y="2089492"/>
+            <a:ext cx="3049279" cy="2791614"/>
+          </a:xfrm>
+          <a:prstGeom prst="rect">
+            <a:avLst/>
+          </a:prstGeom>
+          <a:noFill/>
+          <a:extLst>
+            <a:ext uri="{909E8E84-426E-40DD-AFC4-6F175D3DCCD1}">
+              <a14:hiddenFill xmlns:a14="http://schemas.microsoft.com/office/drawing/2010/main">
+                <a:solidFill>
+                  <a:srgbClr val="FFFFFF"/>
+                </a:solidFill>
+              </a14:hiddenFill>
+            </a:ext>
+          </a:extLst>
+        </p:spPr>
+      </p:pic>
+    </p:spTree>
+    <p:extLst>
+      <p:ext uri="{BB962C8B-B14F-4D97-AF65-F5344CB8AC3E}">
+        <p14:creationId xmlns:p14="http://schemas.microsoft.com/office/powerpoint/2010/main" val="3724606977"/>
       </p:ext>
     </p:extLst>
   </p:cSld>

</xml_diff>